<commit_message>
added link, rearranged links
</commit_message>
<xml_diff>
--- a/Resources/Build-On-2.pptx
+++ b/Resources/Build-On-2.pptx
@@ -4553,7 +4553,7 @@
               <a:rPr lang="en-US" dirty="0">
                 <a:hlinkClick r:id="rId5"/>
               </a:rPr>
-              <a:t>Functions</a:t>
+              <a:t>Tooling</a:t>
             </a:r>
             <a:endParaRPr lang="en-US" dirty="0"/>
           </a:p>
@@ -4563,17 +4563,17 @@
               <a:rPr lang="en-US" dirty="0">
                 <a:hlinkClick r:id="rId6"/>
               </a:rPr>
-              <a:t>Structs</a:t>
+              <a:t>Functions</a:t>
             </a:r>
             <a:endParaRPr lang="en-US" dirty="0"/>
           </a:p>
           <a:p>
             <a:pPr lvl="1"/>
             <a:r>
-              <a:rPr lang="en-US" dirty="0" err="1">
+              <a:rPr lang="en-US" dirty="0">
                 <a:hlinkClick r:id="rId7"/>
               </a:rPr>
-              <a:t>RustStory_Libraries.html#fs</a:t>
+              <a:t>Structs</a:t>
             </a:r>
             <a:endParaRPr lang="en-US" dirty="0"/>
           </a:p>
@@ -4583,6 +4583,16 @@
               <a:rPr lang="en-US" dirty="0" err="1">
                 <a:hlinkClick r:id="rId8"/>
               </a:rPr>
+              <a:t>RustStory_Libraries.html#fs</a:t>
+            </a:r>
+            <a:endParaRPr lang="en-US" dirty="0"/>
+          </a:p>
+          <a:p>
+            <a:pPr lvl="1"/>
+            <a:r>
+              <a:rPr lang="en-US" dirty="0" err="1">
+                <a:hlinkClick r:id="rId9"/>
+              </a:rPr>
               <a:t>std:fs</a:t>
             </a:r>
             <a:endParaRPr lang="en-US" dirty="0"/>
@@ -4592,7 +4602,7 @@
               <a:buNone/>
             </a:pPr>
             <a:endParaRPr lang="en-US" dirty="0">
-              <a:hlinkClick r:id="rId9"/>
+              <a:hlinkClick r:id="rId10"/>
             </a:endParaRPr>
           </a:p>
         </p:txBody>
@@ -4673,49 +4683,40 @@
           <a:p>
             <a:r>
               <a:rPr lang="en-US" dirty="0">
-                <a:hlinkClick r:id="rId10"/>
+                <a:hlinkClick r:id="rId11"/>
               </a:rPr>
               <a:t>Safety</a:t>
             </a:r>
             <a:endParaRPr lang="en-US" dirty="0">
-              <a:hlinkClick r:id="rId11" action="ppaction://hlinkfile"/>
+              <a:hlinkClick r:id="rId12" action="ppaction://hlinkfile"/>
             </a:endParaRPr>
           </a:p>
           <a:p>
             <a:r>
               <a:rPr lang="en-US" dirty="0" err="1">
-                <a:hlinkClick r:id="rId12"/>
+                <a:hlinkClick r:id="rId13"/>
               </a:rPr>
               <a:t>RustBite_Data</a:t>
             </a:r>
             <a:endParaRPr lang="en-US" dirty="0">
-              <a:hlinkClick r:id="rId13"/>
+              <a:hlinkClick r:id="rId14"/>
             </a:endParaRPr>
-          </a:p>
-          <a:p>
-            <a:r>
-              <a:rPr lang="en-US" dirty="0">
-                <a:hlinkClick r:id="rId13"/>
-              </a:rPr>
-              <a:t>Rust Bites</a:t>
-            </a:r>
-            <a:endParaRPr lang="en-US" dirty="0"/>
           </a:p>
           <a:p>
             <a:r>
               <a:rPr lang="en-US" dirty="0">
                 <a:hlinkClick r:id="rId14"/>
               </a:rPr>
-              <a:t>Rust Story</a:t>
+              <a:t>Rust Bites</a:t>
             </a:r>
             <a:endParaRPr lang="en-US" dirty="0"/>
           </a:p>
           <a:p>
             <a:r>
-              <a:rPr lang="en-US" dirty="0" err="1">
+              <a:rPr lang="en-US" dirty="0">
                 <a:hlinkClick r:id="rId15"/>
               </a:rPr>
-              <a:t>BuildOn</a:t>
+              <a:t>Rust Story</a:t>
             </a:r>
             <a:endParaRPr lang="en-US" dirty="0"/>
           </a:p>
@@ -4735,6 +4736,21 @@
               </a:rPr>
               <a:t>Code Experiments</a:t>
             </a:r>
+            <a:endParaRPr lang="en-US" dirty="0"/>
+          </a:p>
+          <a:p>
+            <a:r>
+              <a:rPr lang="en-US" dirty="0" err="1">
+                <a:hlinkClick r:id="rId18"/>
+              </a:rPr>
+              <a:t>BuildOn</a:t>
+            </a:r>
+            <a:endParaRPr lang="en-US"/>
+          </a:p>
+          <a:p>
+            <a:pPr marL="0" indent="0">
+              <a:buNone/>
+            </a:pPr>
             <a:endParaRPr lang="en-US" dirty="0"/>
           </a:p>
           <a:p>

</xml_diff>

<commit_message>
added detail to ownership demo in Anim_Features
</commit_message>
<xml_diff>
--- a/Resources/Build-On-2.pptx
+++ b/Resources/Build-On-2.pptx
@@ -268,7 +268,7 @@
           <a:p>
             <a:fld id="{62A8A12F-4B01-424F-AD07-F42ED760B84B}" type="datetimeFigureOut">
               <a:rPr lang="en-US" smtClean="0"/>
-              <a:t>2/21/2021</a:t>
+              <a:t>2/24/2021</a:t>
             </a:fld>
             <a:endParaRPr lang="en-US"/>
           </a:p>
@@ -466,7 +466,7 @@
           <a:p>
             <a:fld id="{62A8A12F-4B01-424F-AD07-F42ED760B84B}" type="datetimeFigureOut">
               <a:rPr lang="en-US" smtClean="0"/>
-              <a:t>2/21/2021</a:t>
+              <a:t>2/24/2021</a:t>
             </a:fld>
             <a:endParaRPr lang="en-US"/>
           </a:p>
@@ -674,7 +674,7 @@
           <a:p>
             <a:fld id="{62A8A12F-4B01-424F-AD07-F42ED760B84B}" type="datetimeFigureOut">
               <a:rPr lang="en-US" smtClean="0"/>
-              <a:t>2/21/2021</a:t>
+              <a:t>2/24/2021</a:t>
             </a:fld>
             <a:endParaRPr lang="en-US"/>
           </a:p>
@@ -872,7 +872,7 @@
           <a:p>
             <a:fld id="{62A8A12F-4B01-424F-AD07-F42ED760B84B}" type="datetimeFigureOut">
               <a:rPr lang="en-US" smtClean="0"/>
-              <a:t>2/21/2021</a:t>
+              <a:t>2/24/2021</a:t>
             </a:fld>
             <a:endParaRPr lang="en-US"/>
           </a:p>
@@ -1147,7 +1147,7 @@
           <a:p>
             <a:fld id="{62A8A12F-4B01-424F-AD07-F42ED760B84B}" type="datetimeFigureOut">
               <a:rPr lang="en-US" smtClean="0"/>
-              <a:t>2/21/2021</a:t>
+              <a:t>2/24/2021</a:t>
             </a:fld>
             <a:endParaRPr lang="en-US"/>
           </a:p>
@@ -1412,7 +1412,7 @@
           <a:p>
             <a:fld id="{62A8A12F-4B01-424F-AD07-F42ED760B84B}" type="datetimeFigureOut">
               <a:rPr lang="en-US" smtClean="0"/>
-              <a:t>2/21/2021</a:t>
+              <a:t>2/24/2021</a:t>
             </a:fld>
             <a:endParaRPr lang="en-US"/>
           </a:p>
@@ -1824,7 +1824,7 @@
           <a:p>
             <a:fld id="{62A8A12F-4B01-424F-AD07-F42ED760B84B}" type="datetimeFigureOut">
               <a:rPr lang="en-US" smtClean="0"/>
-              <a:t>2/21/2021</a:t>
+              <a:t>2/24/2021</a:t>
             </a:fld>
             <a:endParaRPr lang="en-US"/>
           </a:p>
@@ -1965,7 +1965,7 @@
           <a:p>
             <a:fld id="{62A8A12F-4B01-424F-AD07-F42ED760B84B}" type="datetimeFigureOut">
               <a:rPr lang="en-US" smtClean="0"/>
-              <a:t>2/21/2021</a:t>
+              <a:t>2/24/2021</a:t>
             </a:fld>
             <a:endParaRPr lang="en-US"/>
           </a:p>
@@ -2078,7 +2078,7 @@
           <a:p>
             <a:fld id="{62A8A12F-4B01-424F-AD07-F42ED760B84B}" type="datetimeFigureOut">
               <a:rPr lang="en-US" smtClean="0"/>
-              <a:t>2/21/2021</a:t>
+              <a:t>2/24/2021</a:t>
             </a:fld>
             <a:endParaRPr lang="en-US"/>
           </a:p>
@@ -2389,7 +2389,7 @@
           <a:p>
             <a:fld id="{62A8A12F-4B01-424F-AD07-F42ED760B84B}" type="datetimeFigureOut">
               <a:rPr lang="en-US" smtClean="0"/>
-              <a:t>2/21/2021</a:t>
+              <a:t>2/24/2021</a:t>
             </a:fld>
             <a:endParaRPr lang="en-US"/>
           </a:p>
@@ -2677,7 +2677,7 @@
           <a:p>
             <a:fld id="{62A8A12F-4B01-424F-AD07-F42ED760B84B}" type="datetimeFigureOut">
               <a:rPr lang="en-US" smtClean="0"/>
-              <a:t>2/21/2021</a:t>
+              <a:t>2/24/2021</a:t>
             </a:fld>
             <a:endParaRPr lang="en-US"/>
           </a:p>
@@ -2918,7 +2918,7 @@
           <a:p>
             <a:fld id="{62A8A12F-4B01-424F-AD07-F42ED760B84B}" type="datetimeFigureOut">
               <a:rPr lang="en-US" smtClean="0"/>
-              <a:t>2/21/2021</a:t>
+              <a:t>2/24/2021</a:t>
             </a:fld>
             <a:endParaRPr lang="en-US"/>
           </a:p>
@@ -4598,11 +4598,23 @@
             <a:endParaRPr lang="en-US" dirty="0"/>
           </a:p>
           <a:p>
+            <a:r>
+              <a:rPr lang="en-US" dirty="0" err="1">
+                <a:hlinkClick r:id="rId10"/>
+              </a:rPr>
+              <a:t>BuildOn</a:t>
+            </a:r>
+            <a:endParaRPr lang="en-US" dirty="0"/>
+          </a:p>
+          <a:p>
+            <a:endParaRPr lang="en-US" dirty="0"/>
+          </a:p>
+          <a:p>
             <a:pPr marL="0" indent="0">
               <a:buNone/>
             </a:pPr>
             <a:endParaRPr lang="en-US" dirty="0">
-              <a:hlinkClick r:id="rId10"/>
+              <a:hlinkClick r:id="rId11"/>
             </a:endParaRPr>
           </a:p>
         </p:txBody>
@@ -4683,49 +4695,61 @@
           <a:p>
             <a:r>
               <a:rPr lang="en-US" dirty="0">
-                <a:hlinkClick r:id="rId11"/>
+                <a:hlinkClick r:id="rId12"/>
               </a:rPr>
               <a:t>Safety</a:t>
             </a:r>
-            <a:endParaRPr lang="en-US" dirty="0">
-              <a:hlinkClick r:id="rId12" action="ppaction://hlinkfile"/>
-            </a:endParaRPr>
+            <a:endParaRPr lang="en-US" dirty="0"/>
           </a:p>
           <a:p>
             <a:r>
               <a:rPr lang="en-US" dirty="0" err="1">
                 <a:hlinkClick r:id="rId13"/>
               </a:rPr>
+              <a:t>Anim_Features</a:t>
+            </a:r>
+            <a:endParaRPr lang="en-US" dirty="0"/>
+          </a:p>
+          <a:p>
+            <a:r>
+              <a:rPr lang="en-US" dirty="0" err="1">
+                <a:hlinkClick r:id="rId13"/>
+              </a:rPr>
+              <a:t>Anim</a:t>
+            </a:r>
+            <a:r>
+              <a:rPr lang="en-US" err="1">
+                <a:hlinkClick r:id="rId13"/>
+              </a:rPr>
+              <a:t>_</a:t>
+            </a:r>
+            <a:r>
+              <a:rPr lang="en-US">
+                <a:hlinkClick r:id="rId13"/>
+              </a:rPr>
+              <a:t>Features</a:t>
+            </a:r>
+            <a:endParaRPr lang="en-US" dirty="0">
+              <a:hlinkClick r:id="rId14" action="ppaction://hlinkfile"/>
+            </a:endParaRPr>
+          </a:p>
+          <a:p>
+            <a:r>
+              <a:rPr lang="en-US" dirty="0" err="1">
+                <a:hlinkClick r:id="rId15"/>
+              </a:rPr>
               <a:t>RustBite_Data</a:t>
             </a:r>
             <a:endParaRPr lang="en-US" dirty="0">
-              <a:hlinkClick r:id="rId14"/>
+              <a:hlinkClick r:id="rId16"/>
             </a:endParaRPr>
           </a:p>
           <a:p>
             <a:r>
               <a:rPr lang="en-US" dirty="0">
-                <a:hlinkClick r:id="rId14"/>
+                <a:hlinkClick r:id="rId16"/>
               </a:rPr>
               <a:t>Rust Bites</a:t>
-            </a:r>
-            <a:endParaRPr lang="en-US" dirty="0"/>
-          </a:p>
-          <a:p>
-            <a:r>
-              <a:rPr lang="en-US" dirty="0">
-                <a:hlinkClick r:id="rId15"/>
-              </a:rPr>
-              <a:t>Rust Story</a:t>
-            </a:r>
-            <a:endParaRPr lang="en-US" dirty="0"/>
-          </a:p>
-          <a:p>
-            <a:r>
-              <a:rPr lang="en-US" dirty="0" err="1">
-                <a:hlinkClick r:id="rId16"/>
-              </a:rPr>
-              <a:t>Anim_Features</a:t>
             </a:r>
             <a:endParaRPr lang="en-US" dirty="0"/>
           </a:p>
@@ -4734,18 +4758,24 @@
               <a:rPr lang="en-US" dirty="0">
                 <a:hlinkClick r:id="rId17"/>
               </a:rPr>
-              <a:t>Code Experiments</a:t>
+              <a:t>Rust Story</a:t>
             </a:r>
             <a:endParaRPr lang="en-US" dirty="0"/>
           </a:p>
           <a:p>
             <a:r>
-              <a:rPr lang="en-US" dirty="0" err="1">
+              <a:rPr lang="en-US" dirty="0">
                 <a:hlinkClick r:id="rId18"/>
               </a:rPr>
-              <a:t>BuildOn</a:t>
-            </a:r>
-            <a:endParaRPr lang="en-US"/>
+              <a:t>Code Experiments</a:t>
+            </a:r>
+            <a:endParaRPr lang="en-US" dirty="0"/>
+          </a:p>
+          <a:p>
+            <a:pPr marL="0" indent="0">
+              <a:buNone/>
+            </a:pPr>
+            <a:endParaRPr lang="en-US" dirty="0"/>
           </a:p>
           <a:p>
             <a:pPr marL="0" indent="0">

</xml_diff>

<commit_message>
updated content in Build-On-2 presentation
</commit_message>
<xml_diff>
--- a/Resources/Build-On-2.pptx
+++ b/Resources/Build-On-2.pptx
@@ -3414,7 +3414,7 @@
           <a:p>
             <a:r>
               <a:rPr lang="en-US" dirty="0"/>
-              <a:t>February 19, 2021</a:t>
+              <a:t>February 26, 2021</a:t>
             </a:r>
           </a:p>
         </p:txBody>
@@ -4396,7 +4396,12 @@
             <p:ph type="title"/>
           </p:nvPr>
         </p:nvSpPr>
-        <p:spPr/>
+        <p:spPr>
+          <a:xfrm>
+            <a:off x="839788" y="365126"/>
+            <a:ext cx="10515600" cy="948770"/>
+          </a:xfrm>
+        </p:spPr>
         <p:style>
           <a:lnRef idx="2">
             <a:schemeClr val="accent3"/>
@@ -4448,8 +4453,8 @@
         </p:nvSpPr>
         <p:spPr>
           <a:xfrm>
-            <a:off x="839788" y="1681163"/>
-            <a:ext cx="5157787" cy="611981"/>
+            <a:off x="839788" y="1405950"/>
+            <a:ext cx="5157787" cy="484994"/>
           </a:xfrm>
         </p:spPr>
         <p:txBody>
@@ -4489,8 +4494,8 @@
         </p:nvSpPr>
         <p:spPr>
           <a:xfrm>
-            <a:off x="839788" y="2293144"/>
-            <a:ext cx="5157787" cy="4121944"/>
+            <a:off x="839788" y="1946906"/>
+            <a:ext cx="5157787" cy="4474943"/>
           </a:xfrm>
           <a:ln/>
         </p:spPr>
@@ -4607,6 +4612,17 @@
             <a:endParaRPr lang="en-US" dirty="0"/>
           </a:p>
           <a:p>
+            <a:r>
+              <a:rPr lang="en-US" dirty="0"/>
+              <a:t>Run </a:t>
+            </a:r>
+            <a:r>
+              <a:rPr lang="en-US" dirty="0" err="1"/>
+              <a:t>TextFinder</a:t>
+            </a:r>
+            <a:endParaRPr lang="en-US" dirty="0"/>
+          </a:p>
+          <a:p>
             <a:endParaRPr lang="en-US" dirty="0"/>
           </a:p>
           <a:p>
@@ -4637,8 +4653,8 @@
         </p:nvSpPr>
         <p:spPr>
           <a:xfrm>
-            <a:off x="6172200" y="1681163"/>
-            <a:ext cx="5183188" cy="611981"/>
+            <a:off x="6172200" y="1405950"/>
+            <a:ext cx="5183188" cy="484994"/>
           </a:xfrm>
         </p:spPr>
         <p:txBody>
@@ -4670,8 +4686,8 @@
         </p:nvSpPr>
         <p:spPr>
           <a:xfrm>
-            <a:off x="6172200" y="2293144"/>
-            <a:ext cx="5183188" cy="4121944"/>
+            <a:off x="6169024" y="1946907"/>
+            <a:ext cx="5183188" cy="4474943"/>
           </a:xfrm>
           <a:ln/>
         </p:spPr>
@@ -4708,27 +4724,6 @@
               </a:rPr>
               <a:t>Anim_Features</a:t>
             </a:r>
-            <a:endParaRPr lang="en-US" dirty="0"/>
-          </a:p>
-          <a:p>
-            <a:r>
-              <a:rPr lang="en-US" dirty="0" err="1">
-                <a:hlinkClick r:id="rId13"/>
-              </a:rPr>
-              <a:t>Anim</a:t>
-            </a:r>
-            <a:r>
-              <a:rPr lang="en-US" err="1">
-                <a:hlinkClick r:id="rId13"/>
-              </a:rPr>
-              <a:t>_</a:t>
-            </a:r>
-            <a:r>
-              <a:rPr lang="en-US">
-                <a:hlinkClick r:id="rId13"/>
-              </a:rPr>
-              <a:t>Features</a:t>
-            </a:r>
             <a:endParaRPr lang="en-US" dirty="0">
               <a:hlinkClick r:id="rId14" action="ppaction://hlinkfile"/>
             </a:endParaRPr>
@@ -4770,6 +4765,12 @@
               <a:t>Code Experiments</a:t>
             </a:r>
             <a:endParaRPr lang="en-US" dirty="0"/>
+          </a:p>
+          <a:p>
+            <a:r>
+              <a:rPr lang="en-US" b="1" dirty="0"/>
+              <a:t>Questions?</a:t>
+            </a:r>
           </a:p>
           <a:p>
             <a:pPr marL="0" indent="0">

</xml_diff>